<commit_message>
Rebuild pages at 94c0efb2a5ea053aa3a5cfa3b5521a7787cfbac1
</commit_message>
<xml_diff>
--- a/images/UndoAndRedo/UndoAndRedoImplementation.pptx
+++ b/images/UndoAndRedo/UndoAndRedoImplementation.pptx
@@ -267,7 +267,7 @@
           <a:p>
             <a:fld id="{856F11DA-9A3A-4A86-BE9C-A62BF20F1BAD}" type="datetimeFigureOut">
               <a:rPr lang="en-SG" smtClean="0"/>
-              <a:t>22/10/2019</a:t>
+              <a:t>1/11/2019</a:t>
             </a:fld>
             <a:endParaRPr lang="en-SG"/>
           </a:p>
@@ -467,7 +467,7 @@
           <a:p>
             <a:fld id="{856F11DA-9A3A-4A86-BE9C-A62BF20F1BAD}" type="datetimeFigureOut">
               <a:rPr lang="en-SG" smtClean="0"/>
-              <a:t>22/10/2019</a:t>
+              <a:t>1/11/2019</a:t>
             </a:fld>
             <a:endParaRPr lang="en-SG"/>
           </a:p>
@@ -677,7 +677,7 @@
           <a:p>
             <a:fld id="{856F11DA-9A3A-4A86-BE9C-A62BF20F1BAD}" type="datetimeFigureOut">
               <a:rPr lang="en-SG" smtClean="0"/>
-              <a:t>22/10/2019</a:t>
+              <a:t>1/11/2019</a:t>
             </a:fld>
             <a:endParaRPr lang="en-SG"/>
           </a:p>
@@ -877,7 +877,7 @@
           <a:p>
             <a:fld id="{856F11DA-9A3A-4A86-BE9C-A62BF20F1BAD}" type="datetimeFigureOut">
               <a:rPr lang="en-SG" smtClean="0"/>
-              <a:t>22/10/2019</a:t>
+              <a:t>1/11/2019</a:t>
             </a:fld>
             <a:endParaRPr lang="en-SG"/>
           </a:p>
@@ -1153,7 +1153,7 @@
           <a:p>
             <a:fld id="{856F11DA-9A3A-4A86-BE9C-A62BF20F1BAD}" type="datetimeFigureOut">
               <a:rPr lang="en-SG" smtClean="0"/>
-              <a:t>22/10/2019</a:t>
+              <a:t>1/11/2019</a:t>
             </a:fld>
             <a:endParaRPr lang="en-SG"/>
           </a:p>
@@ -1421,7 +1421,7 @@
           <a:p>
             <a:fld id="{856F11DA-9A3A-4A86-BE9C-A62BF20F1BAD}" type="datetimeFigureOut">
               <a:rPr lang="en-SG" smtClean="0"/>
-              <a:t>22/10/2019</a:t>
+              <a:t>1/11/2019</a:t>
             </a:fld>
             <a:endParaRPr lang="en-SG"/>
           </a:p>
@@ -1836,7 +1836,7 @@
           <a:p>
             <a:fld id="{856F11DA-9A3A-4A86-BE9C-A62BF20F1BAD}" type="datetimeFigureOut">
               <a:rPr lang="en-SG" smtClean="0"/>
-              <a:t>22/10/2019</a:t>
+              <a:t>1/11/2019</a:t>
             </a:fld>
             <a:endParaRPr lang="en-SG"/>
           </a:p>
@@ -1978,7 +1978,7 @@
           <a:p>
             <a:fld id="{856F11DA-9A3A-4A86-BE9C-A62BF20F1BAD}" type="datetimeFigureOut">
               <a:rPr lang="en-SG" smtClean="0"/>
-              <a:t>22/10/2019</a:t>
+              <a:t>1/11/2019</a:t>
             </a:fld>
             <a:endParaRPr lang="en-SG"/>
           </a:p>
@@ -2091,7 +2091,7 @@
           <a:p>
             <a:fld id="{856F11DA-9A3A-4A86-BE9C-A62BF20F1BAD}" type="datetimeFigureOut">
               <a:rPr lang="en-SG" smtClean="0"/>
-              <a:t>22/10/2019</a:t>
+              <a:t>1/11/2019</a:t>
             </a:fld>
             <a:endParaRPr lang="en-SG"/>
           </a:p>
@@ -2404,7 +2404,7 @@
           <a:p>
             <a:fld id="{856F11DA-9A3A-4A86-BE9C-A62BF20F1BAD}" type="datetimeFigureOut">
               <a:rPr lang="en-SG" smtClean="0"/>
-              <a:t>22/10/2019</a:t>
+              <a:t>1/11/2019</a:t>
             </a:fld>
             <a:endParaRPr lang="en-SG"/>
           </a:p>
@@ -2693,7 +2693,7 @@
           <a:p>
             <a:fld id="{856F11DA-9A3A-4A86-BE9C-A62BF20F1BAD}" type="datetimeFigureOut">
               <a:rPr lang="en-SG" smtClean="0"/>
-              <a:t>22/10/2019</a:t>
+              <a:t>1/11/2019</a:t>
             </a:fld>
             <a:endParaRPr lang="en-SG"/>
           </a:p>
@@ -2936,7 +2936,7 @@
           <a:p>
             <a:fld id="{856F11DA-9A3A-4A86-BE9C-A62BF20F1BAD}" type="datetimeFigureOut">
               <a:rPr lang="en-SG" smtClean="0"/>
-              <a:t>22/10/2019</a:t>
+              <a:t>1/11/2019</a:t>
             </a:fld>
             <a:endParaRPr lang="en-SG"/>
           </a:p>
@@ -3974,14 +3974,14 @@
         </p:nvSpPr>
         <p:spPr>
           <a:xfrm>
-            <a:off x="3972040" y="5518694"/>
+            <a:off x="3972040" y="5527572"/>
             <a:ext cx="1717446" cy="316727"/>
           </a:xfrm>
           <a:prstGeom prst="rect">
             <a:avLst/>
           </a:prstGeom>
           <a:solidFill>
-            <a:srgbClr val="FEFECE"/>
+            <a:srgbClr val="3333C4"/>
           </a:solidFill>
         </p:spPr>
         <p:style>
@@ -4004,10 +4004,18 @@
           <a:p>
             <a:pPr algn="ctr"/>
             <a:r>
-              <a:rPr lang="en-US" sz="1200" u="sng" dirty="0"/>
+              <a:rPr lang="en-US" sz="1200" u="sng" dirty="0">
+                <a:solidFill>
+                  <a:schemeClr val="bg1"/>
+                </a:solidFill>
+              </a:rPr>
               <a:t>a:AddExpenseCommand</a:t>
             </a:r>
-            <a:endParaRPr lang="en-SG" sz="1200" u="sng" dirty="0"/>
+            <a:endParaRPr lang="en-SG" sz="1200" u="sng" dirty="0">
+              <a:solidFill>
+                <a:schemeClr val="bg1"/>
+              </a:solidFill>
+            </a:endParaRPr>
           </a:p>
         </p:txBody>
       </p:sp>
@@ -4042,15 +4050,7 @@
             <a:pPr algn="ctr"/>
             <a:r>
               <a:rPr lang="en-US" dirty="0"/>
-              <a:t>After command “</a:t>
-            </a:r>
-            <a:r>
-              <a:rPr lang="en-US" dirty="0" err="1"/>
-              <a:t>add_expense</a:t>
-            </a:r>
-            <a:r>
-              <a:rPr lang="en-US" dirty="0"/>
-              <a:t> n/Laksa v/4”</a:t>
+              <a:t>After command “add_expense n/Laksa v/4”</a:t>
             </a:r>
             <a:endParaRPr lang="en-SG" dirty="0"/>
           </a:p>
@@ -4413,7 +4413,7 @@
             <a:avLst/>
           </a:prstGeom>
           <a:solidFill>
-            <a:srgbClr val="FEFECE"/>
+            <a:srgbClr val="3333C4"/>
           </a:solidFill>
         </p:spPr>
         <p:style>
@@ -4436,10 +4436,18 @@
           <a:p>
             <a:pPr algn="ctr"/>
             <a:r>
-              <a:rPr lang="en-US" sz="1200" u="sng" dirty="0"/>
+              <a:rPr lang="en-US" sz="1200" u="sng" dirty="0">
+                <a:solidFill>
+                  <a:schemeClr val="bg1"/>
+                </a:solidFill>
+              </a:rPr>
               <a:t>a:AddExpenseCommand</a:t>
             </a:r>
-            <a:endParaRPr lang="en-SG" sz="1200" u="sng" dirty="0"/>
+            <a:endParaRPr lang="en-SG" sz="1200" u="sng" dirty="0">
+              <a:solidFill>
+                <a:schemeClr val="bg1"/>
+              </a:solidFill>
+            </a:endParaRPr>
           </a:p>
         </p:txBody>
       </p:sp>
@@ -4536,7 +4544,7 @@
             <a:avLst/>
           </a:prstGeom>
           <a:solidFill>
-            <a:srgbClr val="FEFECE"/>
+            <a:srgbClr val="3333C4"/>
           </a:solidFill>
         </p:spPr>
         <p:style>
@@ -4559,10 +4567,18 @@
           <a:p>
             <a:pPr algn="ctr"/>
             <a:r>
-              <a:rPr lang="en-US" sz="1200" u="sng" dirty="0"/>
+              <a:rPr lang="en-US" sz="1200" u="sng" dirty="0">
+                <a:solidFill>
+                  <a:schemeClr val="bg1"/>
+                </a:solidFill>
+              </a:rPr>
               <a:t>u:UpdateCommand</a:t>
             </a:r>
-            <a:endParaRPr lang="en-SG" sz="1200" u="sng" dirty="0"/>
+            <a:endParaRPr lang="en-SG" sz="1200" u="sng" dirty="0">
+              <a:solidFill>
+                <a:schemeClr val="bg1"/>
+              </a:solidFill>
+            </a:endParaRPr>
           </a:p>
         </p:txBody>
       </p:sp>
@@ -4597,15 +4613,7 @@
             <a:pPr algn="ctr"/>
             <a:r>
               <a:rPr lang="en-US" dirty="0"/>
-              <a:t>After command “update </a:t>
-            </a:r>
-            <a:r>
-              <a:rPr lang="en-US" dirty="0" err="1"/>
-              <a:t>i</a:t>
-            </a:r>
-            <a:r>
-              <a:rPr lang="en-US" dirty="0"/>
-              <a:t>/1 v/3.5”</a:t>
+              <a:t>After command “update i/1 v/3.5”</a:t>
             </a:r>
             <a:endParaRPr lang="en-SG" dirty="0"/>
           </a:p>
@@ -4889,14 +4897,14 @@
         </p:nvSpPr>
         <p:spPr>
           <a:xfrm>
-            <a:off x="3972040" y="5511074"/>
+            <a:off x="3972040" y="5528830"/>
             <a:ext cx="1707127" cy="316727"/>
           </a:xfrm>
           <a:prstGeom prst="rect">
             <a:avLst/>
           </a:prstGeom>
           <a:solidFill>
-            <a:srgbClr val="FEFECE"/>
+            <a:srgbClr val="3333C4"/>
           </a:solidFill>
         </p:spPr>
         <p:style>
@@ -4919,10 +4927,18 @@
           <a:p>
             <a:pPr algn="ctr"/>
             <a:r>
-              <a:rPr lang="en-US" sz="1200" u="sng" dirty="0"/>
+              <a:rPr lang="en-US" sz="1200" u="sng" dirty="0">
+                <a:solidFill>
+                  <a:schemeClr val="bg1"/>
+                </a:solidFill>
+              </a:rPr>
               <a:t>a:AddExpenseCommand</a:t>
             </a:r>
-            <a:endParaRPr lang="en-SG" sz="1200" u="sng" dirty="0"/>
+            <a:endParaRPr lang="en-SG" sz="1200" u="sng" dirty="0">
+              <a:solidFill>
+                <a:schemeClr val="bg1"/>
+              </a:solidFill>
+            </a:endParaRPr>
           </a:p>
         </p:txBody>
       </p:sp>
@@ -5019,7 +5035,7 @@
             <a:avLst/>
           </a:prstGeom>
           <a:solidFill>
-            <a:srgbClr val="FEFECE"/>
+            <a:srgbClr val="3333C4"/>
           </a:solidFill>
         </p:spPr>
         <p:style>
@@ -5042,10 +5058,18 @@
           <a:p>
             <a:pPr algn="ctr"/>
             <a:r>
-              <a:rPr lang="en-US" sz="1200" u="sng" dirty="0"/>
+              <a:rPr lang="en-US" sz="1200" u="sng" dirty="0">
+                <a:solidFill>
+                  <a:schemeClr val="bg1"/>
+                </a:solidFill>
+              </a:rPr>
               <a:t>u:UpdateCommand</a:t>
             </a:r>
-            <a:endParaRPr lang="en-SG" sz="1200" u="sng" dirty="0"/>
+            <a:endParaRPr lang="en-SG" sz="1200" u="sng" dirty="0">
+              <a:solidFill>
+                <a:schemeClr val="bg1"/>
+              </a:solidFill>
+            </a:endParaRPr>
           </a:p>
         </p:txBody>
       </p:sp>
@@ -5427,7 +5451,7 @@
             <a:avLst/>
           </a:prstGeom>
           <a:solidFill>
-            <a:srgbClr val="FEFECE"/>
+            <a:srgbClr val="3333C4"/>
           </a:solidFill>
         </p:spPr>
         <p:style>
@@ -5450,10 +5474,18 @@
           <a:p>
             <a:pPr algn="ctr"/>
             <a:r>
-              <a:rPr lang="en-US" sz="1200" u="sng" dirty="0"/>
+              <a:rPr lang="en-US" sz="1200" u="sng" dirty="0">
+                <a:solidFill>
+                  <a:schemeClr val="bg1"/>
+                </a:solidFill>
+              </a:rPr>
               <a:t>a:AddExpenseCommand</a:t>
             </a:r>
-            <a:endParaRPr lang="en-SG" sz="1200" u="sng" dirty="0"/>
+            <a:endParaRPr lang="en-SG" sz="1200" u="sng" dirty="0">
+              <a:solidFill>
+                <a:schemeClr val="bg1"/>
+              </a:solidFill>
+            </a:endParaRPr>
           </a:p>
         </p:txBody>
       </p:sp>
@@ -5550,7 +5582,7 @@
             <a:avLst/>
           </a:prstGeom>
           <a:solidFill>
-            <a:srgbClr val="FEFECE"/>
+            <a:srgbClr val="3333C4"/>
           </a:solidFill>
         </p:spPr>
         <p:style>
@@ -5573,10 +5605,18 @@
           <a:p>
             <a:pPr algn="ctr"/>
             <a:r>
-              <a:rPr lang="en-US" sz="1200" u="sng" dirty="0"/>
+              <a:rPr lang="en-US" sz="1200" u="sng" dirty="0">
+                <a:solidFill>
+                  <a:schemeClr val="bg1"/>
+                </a:solidFill>
+              </a:rPr>
               <a:t>u:UpdateCommand</a:t>
             </a:r>
-            <a:endParaRPr lang="en-SG" sz="1200" u="sng" dirty="0"/>
+            <a:endParaRPr lang="en-SG" sz="1200" u="sng" dirty="0">
+              <a:solidFill>
+                <a:schemeClr val="bg1"/>
+              </a:solidFill>
+            </a:endParaRPr>
           </a:p>
         </p:txBody>
       </p:sp>
@@ -5958,7 +5998,7 @@
             <a:avLst/>
           </a:prstGeom>
           <a:solidFill>
-            <a:srgbClr val="FEFECE"/>
+            <a:srgbClr val="3333C4"/>
           </a:solidFill>
         </p:spPr>
         <p:style>
@@ -5981,10 +6021,18 @@
           <a:p>
             <a:pPr algn="ctr"/>
             <a:r>
-              <a:rPr lang="en-US" sz="1200" u="sng" dirty="0"/>
+              <a:rPr lang="en-US" sz="1200" u="sng" dirty="0">
+                <a:solidFill>
+                  <a:schemeClr val="bg1"/>
+                </a:solidFill>
+              </a:rPr>
               <a:t>a:AddExpenseCommand</a:t>
             </a:r>
-            <a:endParaRPr lang="en-SG" sz="1200" u="sng" dirty="0"/>
+            <a:endParaRPr lang="en-SG" sz="1200" u="sng" dirty="0">
+              <a:solidFill>
+                <a:schemeClr val="bg1"/>
+              </a:solidFill>
+            </a:endParaRPr>
           </a:p>
         </p:txBody>
       </p:sp>
@@ -6081,7 +6129,7 @@
             <a:avLst/>
           </a:prstGeom>
           <a:solidFill>
-            <a:srgbClr val="FEFECE"/>
+            <a:srgbClr val="3333C4"/>
           </a:solidFill>
         </p:spPr>
         <p:style>
@@ -6104,10 +6152,18 @@
           <a:p>
             <a:pPr algn="ctr"/>
             <a:r>
-              <a:rPr lang="en-US" sz="1200" u="sng" dirty="0"/>
+              <a:rPr lang="en-US" sz="1200" u="sng" dirty="0">
+                <a:solidFill>
+                  <a:schemeClr val="bg1"/>
+                </a:solidFill>
+              </a:rPr>
               <a:t>u:UpdateCommand</a:t>
             </a:r>
-            <a:endParaRPr lang="en-SG" sz="1200" u="sng" dirty="0"/>
+            <a:endParaRPr lang="en-SG" sz="1200" u="sng" dirty="0">
+              <a:solidFill>
+                <a:schemeClr val="bg1"/>
+              </a:solidFill>
+            </a:endParaRPr>
           </a:p>
         </p:txBody>
       </p:sp>
@@ -6489,7 +6545,7 @@
             <a:avLst/>
           </a:prstGeom>
           <a:solidFill>
-            <a:srgbClr val="FEFECE"/>
+            <a:srgbClr val="3333C4"/>
           </a:solidFill>
         </p:spPr>
         <p:style>
@@ -6512,10 +6568,18 @@
           <a:p>
             <a:pPr algn="ctr"/>
             <a:r>
-              <a:rPr lang="en-US" sz="1200" u="sng" dirty="0"/>
+              <a:rPr lang="en-US" sz="1200" u="sng" dirty="0">
+                <a:solidFill>
+                  <a:schemeClr val="bg1"/>
+                </a:solidFill>
+              </a:rPr>
               <a:t>a:AddExpenseCommand</a:t>
             </a:r>
-            <a:endParaRPr lang="en-SG" sz="1200" u="sng" dirty="0"/>
+            <a:endParaRPr lang="en-SG" sz="1200" u="sng" dirty="0">
+              <a:solidFill>
+                <a:schemeClr val="bg1"/>
+              </a:solidFill>
+            </a:endParaRPr>
           </a:p>
         </p:txBody>
       </p:sp>
@@ -6622,15 +6686,7 @@
             <a:pPr algn="ctr"/>
             <a:r>
               <a:rPr lang="en-US" dirty="0"/>
-              <a:t>After command “delete </a:t>
-            </a:r>
-            <a:r>
-              <a:rPr lang="en-US" dirty="0" err="1"/>
-              <a:t>i</a:t>
-            </a:r>
-            <a:r>
-              <a:rPr lang="en-US" dirty="0"/>
-              <a:t>/1”</a:t>
+              <a:t>After command “delete i/1”</a:t>
             </a:r>
             <a:endParaRPr lang="en-SG" dirty="0"/>
           </a:p>
@@ -6723,7 +6779,7 @@
             <a:avLst/>
           </a:prstGeom>
           <a:solidFill>
-            <a:srgbClr val="FEFECE"/>
+            <a:srgbClr val="3333C4"/>
           </a:solidFill>
         </p:spPr>
         <p:style>
@@ -6746,10 +6802,18 @@
           <a:p>
             <a:pPr algn="ctr"/>
             <a:r>
-              <a:rPr lang="en-US" sz="1200" u="sng" dirty="0"/>
+              <a:rPr lang="en-US" sz="1200" u="sng" dirty="0">
+                <a:solidFill>
+                  <a:schemeClr val="bg1"/>
+                </a:solidFill>
+              </a:rPr>
               <a:t>d:DeleteCommand</a:t>
             </a:r>
-            <a:endParaRPr lang="en-SG" sz="1200" u="sng" dirty="0"/>
+            <a:endParaRPr lang="en-SG" sz="1200" u="sng" dirty="0">
+              <a:solidFill>
+                <a:schemeClr val="bg1"/>
+              </a:solidFill>
+            </a:endParaRPr>
           </a:p>
         </p:txBody>
       </p:sp>

</xml_diff>

<commit_message>
Rebuild pages at 476a91ff0e9b6dc4afe2cfc236d4f10c0c29dbb2
</commit_message>
<xml_diff>
--- a/images/UndoAndRedo/UndoAndRedoImplementation.pptx
+++ b/images/UndoAndRedo/UndoAndRedoImplementation.pptx
@@ -267,7 +267,7 @@
           <a:p>
             <a:fld id="{856F11DA-9A3A-4A86-BE9C-A62BF20F1BAD}" type="datetimeFigureOut">
               <a:rPr lang="en-SG" smtClean="0"/>
-              <a:t>1/11/2019</a:t>
+              <a:t>9/11/2019</a:t>
             </a:fld>
             <a:endParaRPr lang="en-SG"/>
           </a:p>
@@ -467,7 +467,7 @@
           <a:p>
             <a:fld id="{856F11DA-9A3A-4A86-BE9C-A62BF20F1BAD}" type="datetimeFigureOut">
               <a:rPr lang="en-SG" smtClean="0"/>
-              <a:t>1/11/2019</a:t>
+              <a:t>9/11/2019</a:t>
             </a:fld>
             <a:endParaRPr lang="en-SG"/>
           </a:p>
@@ -677,7 +677,7 @@
           <a:p>
             <a:fld id="{856F11DA-9A3A-4A86-BE9C-A62BF20F1BAD}" type="datetimeFigureOut">
               <a:rPr lang="en-SG" smtClean="0"/>
-              <a:t>1/11/2019</a:t>
+              <a:t>9/11/2019</a:t>
             </a:fld>
             <a:endParaRPr lang="en-SG"/>
           </a:p>
@@ -877,7 +877,7 @@
           <a:p>
             <a:fld id="{856F11DA-9A3A-4A86-BE9C-A62BF20F1BAD}" type="datetimeFigureOut">
               <a:rPr lang="en-SG" smtClean="0"/>
-              <a:t>1/11/2019</a:t>
+              <a:t>9/11/2019</a:t>
             </a:fld>
             <a:endParaRPr lang="en-SG"/>
           </a:p>
@@ -1153,7 +1153,7 @@
           <a:p>
             <a:fld id="{856F11DA-9A3A-4A86-BE9C-A62BF20F1BAD}" type="datetimeFigureOut">
               <a:rPr lang="en-SG" smtClean="0"/>
-              <a:t>1/11/2019</a:t>
+              <a:t>9/11/2019</a:t>
             </a:fld>
             <a:endParaRPr lang="en-SG"/>
           </a:p>
@@ -1421,7 +1421,7 @@
           <a:p>
             <a:fld id="{856F11DA-9A3A-4A86-BE9C-A62BF20F1BAD}" type="datetimeFigureOut">
               <a:rPr lang="en-SG" smtClean="0"/>
-              <a:t>1/11/2019</a:t>
+              <a:t>9/11/2019</a:t>
             </a:fld>
             <a:endParaRPr lang="en-SG"/>
           </a:p>
@@ -1836,7 +1836,7 @@
           <a:p>
             <a:fld id="{856F11DA-9A3A-4A86-BE9C-A62BF20F1BAD}" type="datetimeFigureOut">
               <a:rPr lang="en-SG" smtClean="0"/>
-              <a:t>1/11/2019</a:t>
+              <a:t>9/11/2019</a:t>
             </a:fld>
             <a:endParaRPr lang="en-SG"/>
           </a:p>
@@ -1978,7 +1978,7 @@
           <a:p>
             <a:fld id="{856F11DA-9A3A-4A86-BE9C-A62BF20F1BAD}" type="datetimeFigureOut">
               <a:rPr lang="en-SG" smtClean="0"/>
-              <a:t>1/11/2019</a:t>
+              <a:t>9/11/2019</a:t>
             </a:fld>
             <a:endParaRPr lang="en-SG"/>
           </a:p>
@@ -2091,7 +2091,7 @@
           <a:p>
             <a:fld id="{856F11DA-9A3A-4A86-BE9C-A62BF20F1BAD}" type="datetimeFigureOut">
               <a:rPr lang="en-SG" smtClean="0"/>
-              <a:t>1/11/2019</a:t>
+              <a:t>9/11/2019</a:t>
             </a:fld>
             <a:endParaRPr lang="en-SG"/>
           </a:p>
@@ -2404,7 +2404,7 @@
           <a:p>
             <a:fld id="{856F11DA-9A3A-4A86-BE9C-A62BF20F1BAD}" type="datetimeFigureOut">
               <a:rPr lang="en-SG" smtClean="0"/>
-              <a:t>1/11/2019</a:t>
+              <a:t>9/11/2019</a:t>
             </a:fld>
             <a:endParaRPr lang="en-SG"/>
           </a:p>
@@ -2693,7 +2693,7 @@
           <a:p>
             <a:fld id="{856F11DA-9A3A-4A86-BE9C-A62BF20F1BAD}" type="datetimeFigureOut">
               <a:rPr lang="en-SG" smtClean="0"/>
-              <a:t>1/11/2019</a:t>
+              <a:t>9/11/2019</a:t>
             </a:fld>
             <a:endParaRPr lang="en-SG"/>
           </a:p>
@@ -2936,7 +2936,7 @@
           <a:p>
             <a:fld id="{856F11DA-9A3A-4A86-BE9C-A62BF20F1BAD}" type="datetimeFigureOut">
               <a:rPr lang="en-SG" smtClean="0"/>
-              <a:t>1/11/2019</a:t>
+              <a:t>9/11/2019</a:t>
             </a:fld>
             <a:endParaRPr lang="en-SG"/>
           </a:p>
@@ -5444,7 +5444,7 @@
         </p:nvSpPr>
         <p:spPr>
           <a:xfrm>
-            <a:off x="6595922" y="5231614"/>
+            <a:off x="6595922" y="5533458"/>
             <a:ext cx="1707127" cy="316727"/>
           </a:xfrm>
           <a:prstGeom prst="rect">
@@ -5558,65 +5558,6 @@
               <a:t>RedoStack</a:t>
             </a:r>
             <a:endParaRPr lang="en-SG" dirty="0"/>
-          </a:p>
-        </p:txBody>
-      </p:sp>
-      <p:sp>
-        <p:nvSpPr>
-          <p:cNvPr id="15" name="Rectangle 14">
-            <a:extLst>
-              <a:ext uri="{FF2B5EF4-FFF2-40B4-BE49-F238E27FC236}">
-                <a16:creationId xmlns:a16="http://schemas.microsoft.com/office/drawing/2014/main" id="{F71AD63A-12E2-4704-A97F-5A722BA8F130}"/>
-              </a:ext>
-            </a:extLst>
-          </p:cNvPr>
-          <p:cNvSpPr/>
-          <p:nvPr/>
-        </p:nvSpPr>
-        <p:spPr>
-          <a:xfrm>
-            <a:off x="6595922" y="5529241"/>
-            <a:ext cx="1707127" cy="316727"/>
-          </a:xfrm>
-          <a:prstGeom prst="rect">
-            <a:avLst/>
-          </a:prstGeom>
-          <a:solidFill>
-            <a:srgbClr val="3333C4"/>
-          </a:solidFill>
-        </p:spPr>
-        <p:style>
-          <a:lnRef idx="2">
-            <a:schemeClr val="dk1"/>
-          </a:lnRef>
-          <a:fillRef idx="1">
-            <a:schemeClr val="lt1"/>
-          </a:fillRef>
-          <a:effectRef idx="0">
-            <a:schemeClr val="dk1"/>
-          </a:effectRef>
-          <a:fontRef idx="minor">
-            <a:schemeClr val="dk1"/>
-          </a:fontRef>
-        </p:style>
-        <p:txBody>
-          <a:bodyPr rtlCol="0" anchor="ctr"/>
-          <a:lstStyle/>
-          <a:p>
-            <a:pPr algn="ctr"/>
-            <a:r>
-              <a:rPr lang="en-US" sz="1200" u="sng" dirty="0">
-                <a:solidFill>
-                  <a:schemeClr val="bg1"/>
-                </a:solidFill>
-              </a:rPr>
-              <a:t>u:UpdateCommand</a:t>
-            </a:r>
-            <a:endParaRPr lang="en-SG" sz="1200" u="sng" dirty="0">
-              <a:solidFill>
-                <a:schemeClr val="bg1"/>
-              </a:solidFill>
-            </a:endParaRPr>
           </a:p>
         </p:txBody>
       </p:sp>
@@ -6105,65 +6046,6 @@
               <a:t>RedoStack</a:t>
             </a:r>
             <a:endParaRPr lang="en-SG" dirty="0"/>
-          </a:p>
-        </p:txBody>
-      </p:sp>
-      <p:sp>
-        <p:nvSpPr>
-          <p:cNvPr id="15" name="Rectangle 14">
-            <a:extLst>
-              <a:ext uri="{FF2B5EF4-FFF2-40B4-BE49-F238E27FC236}">
-                <a16:creationId xmlns:a16="http://schemas.microsoft.com/office/drawing/2014/main" id="{F71AD63A-12E2-4704-A97F-5A722BA8F130}"/>
-              </a:ext>
-            </a:extLst>
-          </p:cNvPr>
-          <p:cNvSpPr/>
-          <p:nvPr/>
-        </p:nvSpPr>
-        <p:spPr>
-          <a:xfrm>
-            <a:off x="6595922" y="5529241"/>
-            <a:ext cx="1707127" cy="316727"/>
-          </a:xfrm>
-          <a:prstGeom prst="rect">
-            <a:avLst/>
-          </a:prstGeom>
-          <a:solidFill>
-            <a:srgbClr val="3333C4"/>
-          </a:solidFill>
-        </p:spPr>
-        <p:style>
-          <a:lnRef idx="2">
-            <a:schemeClr val="dk1"/>
-          </a:lnRef>
-          <a:fillRef idx="1">
-            <a:schemeClr val="lt1"/>
-          </a:fillRef>
-          <a:effectRef idx="0">
-            <a:schemeClr val="dk1"/>
-          </a:effectRef>
-          <a:fontRef idx="minor">
-            <a:schemeClr val="dk1"/>
-          </a:fontRef>
-        </p:style>
-        <p:txBody>
-          <a:bodyPr rtlCol="0" anchor="ctr"/>
-          <a:lstStyle/>
-          <a:p>
-            <a:pPr algn="ctr"/>
-            <a:r>
-              <a:rPr lang="en-US" sz="1200" u="sng" dirty="0">
-                <a:solidFill>
-                  <a:schemeClr val="bg1"/>
-                </a:solidFill>
-              </a:rPr>
-              <a:t>u:UpdateCommand</a:t>
-            </a:r>
-            <a:endParaRPr lang="en-SG" sz="1200" u="sng" dirty="0">
-              <a:solidFill>
-                <a:schemeClr val="bg1"/>
-              </a:solidFill>
-            </a:endParaRPr>
           </a:p>
         </p:txBody>
       </p:sp>

</xml_diff>